<commit_message>
Fixed spelling red lines in diagram
</commit_message>
<xml_diff>
--- a/architecture-diagram.pptx
+++ b/architecture-diagram.pptx
@@ -104,6 +104,11 @@
       </a:defRPr>
     </a:lvl9pPr>
   </p:defaultTextStyle>
+  <p:extLst>
+    <p:ext uri="{EFAFB233-063F-42B5-8137-9DF3F51BA10A}">
+      <p15:sldGuideLst xmlns:p15="http://schemas.microsoft.com/office/powerpoint/2012/main"/>
+    </p:ext>
+  </p:extLst>
 </p:presentation>
 </file>
 
@@ -3516,15 +3521,7 @@
             <a:pPr algn="ctr"/>
             <a:r>
               <a:rPr lang="en-US" sz="1400" i="1" dirty="0"/>
-              <a:t>/</a:t>
-            </a:r>
-            <a:r>
-              <a:rPr lang="en-US" sz="1400" i="1" dirty="0" err="1"/>
-              <a:t>aws</a:t>
-            </a:r>
-            <a:r>
-              <a:rPr lang="en-US" sz="1400" i="1" dirty="0"/>
-              <a:t>-app-resources</a:t>
+              <a:t>/aws-app-resources</a:t>
             </a:r>
           </a:p>
           <a:p>
@@ -3819,13 +3816,8 @@
             <a:pPr algn="ctr"/>
             <a:r>
               <a:rPr lang="en-US" sz="1400" dirty="0"/>
-              <a:t>AWS </a:t>
-            </a:r>
-            <a:r>
-              <a:rPr lang="en-US" sz="1400" dirty="0" err="1"/>
-              <a:t>CodePipeline</a:t>
-            </a:r>
-            <a:endParaRPr lang="en-US" sz="1400" dirty="0"/>
+              <a:t>AWS CodePipeline</a:t>
+            </a:r>
           </a:p>
         </p:txBody>
       </p:sp>
@@ -3896,13 +3888,8 @@
             <a:pPr algn="ctr"/>
             <a:r>
               <a:rPr lang="en-US" sz="1400" dirty="0"/>
-              <a:t>AWS </a:t>
-            </a:r>
-            <a:r>
-              <a:rPr lang="en-US" sz="1400" dirty="0" err="1"/>
-              <a:t>CodeBuild</a:t>
-            </a:r>
-            <a:endParaRPr lang="en-US" sz="1400" dirty="0"/>
+              <a:t>AWS CodeBuild</a:t>
+            </a:r>
           </a:p>
           <a:p>
             <a:pPr algn="ctr"/>

</xml_diff>